<commit_message>
added login function. logout. mockups
</commit_message>
<xml_diff>
--- a/MockUps/ThisIsWhatIDIDMobileApp-v2.pptx
+++ b/MockUps/ThisIsWhatIDIDMobileApp-v2.pptx
@@ -5,7 +5,7 @@
     <p:sldMasterId id="2147483648" r:id="rId1"/>
   </p:sldMasterIdLst>
   <p:notesMasterIdLst>
-    <p:notesMasterId r:id="rId12"/>
+    <p:notesMasterId r:id="rId14"/>
   </p:notesMasterIdLst>
   <p:sldIdLst>
     <p:sldId id="256" r:id="rId2"/>
@@ -18,6 +18,8 @@
     <p:sldId id="264" r:id="rId9"/>
     <p:sldId id="260" r:id="rId10"/>
     <p:sldId id="263" r:id="rId11"/>
+    <p:sldId id="268" r:id="rId12"/>
+    <p:sldId id="267" r:id="rId13"/>
   </p:sldIdLst>
   <p:sldSz cx="12192000" cy="6858000"/>
   <p:notesSz cx="6858000" cy="9144000"/>
@@ -206,7 +208,7 @@
           <a:p>
             <a:fld id="{27E8C0E8-D75C-4BFC-A5DD-B8356CA44BFA}" type="datetimeFigureOut">
               <a:rPr lang="en-US" smtClean="0"/>
-              <a:t>9/15/2015</a:t>
+              <a:t>9/16/2015</a:t>
             </a:fld>
             <a:endParaRPr lang="en-US"/>
           </a:p>
@@ -726,6 +728,90 @@
 </p:notes>
 </file>
 
+<file path=ppt/notesSlides/notesSlide4.xml><?xml version="1.0" encoding="utf-8"?>
+<p:notes xmlns:a="http://schemas.openxmlformats.org/drawingml/2006/main" xmlns:r="http://schemas.openxmlformats.org/officeDocument/2006/relationships" xmlns:p="http://schemas.openxmlformats.org/presentationml/2006/main">
+  <p:cSld>
+    <p:spTree>
+      <p:nvGrpSpPr>
+        <p:cNvPr id="1" name=""/>
+        <p:cNvGrpSpPr/>
+        <p:nvPr/>
+      </p:nvGrpSpPr>
+      <p:grpSpPr>
+        <a:xfrm>
+          <a:off x="0" y="0"/>
+          <a:ext cx="0" cy="0"/>
+          <a:chOff x="0" y="0"/>
+          <a:chExt cx="0" cy="0"/>
+        </a:xfrm>
+      </p:grpSpPr>
+      <p:sp>
+        <p:nvSpPr>
+          <p:cNvPr id="2" name="Slide Image Placeholder 1"/>
+          <p:cNvSpPr>
+            <a:spLocks noGrp="1" noRot="1" noChangeAspect="1"/>
+          </p:cNvSpPr>
+          <p:nvPr>
+            <p:ph type="sldImg"/>
+          </p:nvPr>
+        </p:nvSpPr>
+        <p:spPr/>
+      </p:sp>
+      <p:sp>
+        <p:nvSpPr>
+          <p:cNvPr id="3" name="Notes Placeholder 2"/>
+          <p:cNvSpPr>
+            <a:spLocks noGrp="1"/>
+          </p:cNvSpPr>
+          <p:nvPr>
+            <p:ph type="body" idx="1"/>
+          </p:nvPr>
+        </p:nvSpPr>
+        <p:spPr/>
+        <p:txBody>
+          <a:bodyPr/>
+          <a:lstStyle/>
+          <a:p>
+            <a:endParaRPr lang="en-US"/>
+          </a:p>
+        </p:txBody>
+      </p:sp>
+      <p:sp>
+        <p:nvSpPr>
+          <p:cNvPr id="4" name="Slide Number Placeholder 3"/>
+          <p:cNvSpPr>
+            <a:spLocks noGrp="1"/>
+          </p:cNvSpPr>
+          <p:nvPr>
+            <p:ph type="sldNum" sz="quarter" idx="10"/>
+          </p:nvPr>
+        </p:nvSpPr>
+        <p:spPr/>
+        <p:txBody>
+          <a:bodyPr/>
+          <a:lstStyle/>
+          <a:p>
+            <a:fld id="{37ECBF41-9FFB-409A-9206-9B7D8B52FEF2}" type="slidenum">
+              <a:rPr lang="en-US" smtClean="0"/>
+              <a:t>12</a:t>
+            </a:fld>
+            <a:endParaRPr lang="en-US"/>
+          </a:p>
+        </p:txBody>
+      </p:sp>
+    </p:spTree>
+    <p:extLst>
+      <p:ext uri="{BB962C8B-B14F-4D97-AF65-F5344CB8AC3E}">
+        <p14:creationId xmlns:p14="http://schemas.microsoft.com/office/powerpoint/2010/main" val="211953717"/>
+      </p:ext>
+    </p:extLst>
+  </p:cSld>
+  <p:clrMapOvr>
+    <a:masterClrMapping/>
+  </p:clrMapOvr>
+</p:notes>
+</file>
+
 <file path=ppt/slideLayouts/slideLayout1.xml><?xml version="1.0" encoding="utf-8"?>
 <p:sldLayout xmlns:a="http://schemas.openxmlformats.org/drawingml/2006/main" xmlns:r="http://schemas.openxmlformats.org/officeDocument/2006/relationships" xmlns:p="http://schemas.openxmlformats.org/presentationml/2006/main" type="title" preserve="1">
   <p:cSld name="Title Slide">
@@ -857,7 +943,7 @@
           <a:p>
             <a:fld id="{97D1DDE3-8D12-4EE1-85A9-0975856B1713}" type="datetimeFigureOut">
               <a:rPr lang="en-US" smtClean="0"/>
-              <a:t>9/15/2015</a:t>
+              <a:t>9/16/2015</a:t>
             </a:fld>
             <a:endParaRPr lang="en-US"/>
           </a:p>
@@ -1027,7 +1113,7 @@
           <a:p>
             <a:fld id="{97D1DDE3-8D12-4EE1-85A9-0975856B1713}" type="datetimeFigureOut">
               <a:rPr lang="en-US" smtClean="0"/>
-              <a:t>9/15/2015</a:t>
+              <a:t>9/16/2015</a:t>
             </a:fld>
             <a:endParaRPr lang="en-US"/>
           </a:p>
@@ -1207,7 +1293,7 @@
           <a:p>
             <a:fld id="{97D1DDE3-8D12-4EE1-85A9-0975856B1713}" type="datetimeFigureOut">
               <a:rPr lang="en-US" smtClean="0"/>
-              <a:t>9/15/2015</a:t>
+              <a:t>9/16/2015</a:t>
             </a:fld>
             <a:endParaRPr lang="en-US"/>
           </a:p>
@@ -1377,7 +1463,7 @@
           <a:p>
             <a:fld id="{97D1DDE3-8D12-4EE1-85A9-0975856B1713}" type="datetimeFigureOut">
               <a:rPr lang="en-US" smtClean="0"/>
-              <a:t>9/15/2015</a:t>
+              <a:t>9/16/2015</a:t>
             </a:fld>
             <a:endParaRPr lang="en-US"/>
           </a:p>
@@ -1623,7 +1709,7 @@
           <a:p>
             <a:fld id="{97D1DDE3-8D12-4EE1-85A9-0975856B1713}" type="datetimeFigureOut">
               <a:rPr lang="en-US" smtClean="0"/>
-              <a:t>9/15/2015</a:t>
+              <a:t>9/16/2015</a:t>
             </a:fld>
             <a:endParaRPr lang="en-US"/>
           </a:p>
@@ -1855,7 +1941,7 @@
           <a:p>
             <a:fld id="{97D1DDE3-8D12-4EE1-85A9-0975856B1713}" type="datetimeFigureOut">
               <a:rPr lang="en-US" smtClean="0"/>
-              <a:t>9/15/2015</a:t>
+              <a:t>9/16/2015</a:t>
             </a:fld>
             <a:endParaRPr lang="en-US"/>
           </a:p>
@@ -2222,7 +2308,7 @@
           <a:p>
             <a:fld id="{97D1DDE3-8D12-4EE1-85A9-0975856B1713}" type="datetimeFigureOut">
               <a:rPr lang="en-US" smtClean="0"/>
-              <a:t>9/15/2015</a:t>
+              <a:t>9/16/2015</a:t>
             </a:fld>
             <a:endParaRPr lang="en-US"/>
           </a:p>
@@ -2340,7 +2426,7 @@
           <a:p>
             <a:fld id="{97D1DDE3-8D12-4EE1-85A9-0975856B1713}" type="datetimeFigureOut">
               <a:rPr lang="en-US" smtClean="0"/>
-              <a:t>9/15/2015</a:t>
+              <a:t>9/16/2015</a:t>
             </a:fld>
             <a:endParaRPr lang="en-US"/>
           </a:p>
@@ -2435,7 +2521,7 @@
           <a:p>
             <a:fld id="{97D1DDE3-8D12-4EE1-85A9-0975856B1713}" type="datetimeFigureOut">
               <a:rPr lang="en-US" smtClean="0"/>
-              <a:t>9/15/2015</a:t>
+              <a:t>9/16/2015</a:t>
             </a:fld>
             <a:endParaRPr lang="en-US"/>
           </a:p>
@@ -2712,7 +2798,7 @@
           <a:p>
             <a:fld id="{97D1DDE3-8D12-4EE1-85A9-0975856B1713}" type="datetimeFigureOut">
               <a:rPr lang="en-US" smtClean="0"/>
-              <a:t>9/15/2015</a:t>
+              <a:t>9/16/2015</a:t>
             </a:fld>
             <a:endParaRPr lang="en-US"/>
           </a:p>
@@ -2965,7 +3051,7 @@
           <a:p>
             <a:fld id="{97D1DDE3-8D12-4EE1-85A9-0975856B1713}" type="datetimeFigureOut">
               <a:rPr lang="en-US" smtClean="0"/>
-              <a:t>9/15/2015</a:t>
+              <a:t>9/16/2015</a:t>
             </a:fld>
             <a:endParaRPr lang="en-US"/>
           </a:p>
@@ -3178,7 +3264,7 @@
           <a:p>
             <a:fld id="{97D1DDE3-8D12-4EE1-85A9-0975856B1713}" type="datetimeFigureOut">
               <a:rPr lang="en-US" smtClean="0"/>
-              <a:t>9/15/2015</a:t>
+              <a:t>9/16/2015</a:t>
             </a:fld>
             <a:endParaRPr lang="en-US"/>
           </a:p>
@@ -3623,11 +3709,7 @@
           <a:p>
             <a:r>
               <a:rPr lang="en-US" dirty="0" smtClean="0"/>
-              <a:t>Mobile App </a:t>
-            </a:r>
-            <a:r>
-              <a:rPr lang="en-US" dirty="0" smtClean="0"/>
-              <a:t>Validation</a:t>
+              <a:t>Mobile App Validation</a:t>
             </a:r>
           </a:p>
           <a:p>
@@ -3778,8 +3860,8 @@
         </p:nvSpPr>
         <p:spPr>
           <a:xfrm>
-            <a:off x="5193097" y="2251494"/>
-            <a:ext cx="1774169" cy="1708030"/>
+            <a:off x="5359457" y="1911740"/>
+            <a:ext cx="1409412" cy="1405890"/>
           </a:xfrm>
           <a:prstGeom prst="ellipse">
             <a:avLst/>
@@ -3816,7 +3898,7 @@
         </p:nvSpPr>
         <p:spPr>
           <a:xfrm>
-            <a:off x="5224731" y="4042507"/>
+            <a:off x="5224731" y="3389867"/>
             <a:ext cx="1742535" cy="957532"/>
           </a:xfrm>
           <a:prstGeom prst="rect">
@@ -3894,8 +3976,8 @@
         </p:blipFill>
         <p:spPr>
           <a:xfrm>
-            <a:off x="5442647" y="2621783"/>
-            <a:ext cx="1289447" cy="958819"/>
+            <a:off x="5638800" y="2251494"/>
+            <a:ext cx="841202" cy="625509"/>
           </a:xfrm>
           <a:prstGeom prst="rect">
             <a:avLst/>
@@ -3952,14 +4034,16 @@
       </p:sp>
       <p:pic>
         <p:nvPicPr>
-          <p:cNvPr id="8" name="Picture 7"/>
+          <p:cNvPr id="8" name="Picture 7">
+            <a:hlinkClick r:id="rId4" action="ppaction://hlinksldjump"/>
+          </p:cNvPr>
           <p:cNvPicPr>
             <a:picLocks noChangeAspect="1"/>
           </p:cNvPicPr>
           <p:nvPr/>
         </p:nvPicPr>
         <p:blipFill>
-          <a:blip r:embed="rId4" cstate="print">
+          <a:blip r:embed="rId5" cstate="print">
             <a:extLst>
               <a:ext uri="{28A0092B-C50C-407E-A947-70E740481C1C}">
                 <a14:useLocalDpi xmlns:a14="http://schemas.microsoft.com/office/drawing/2010/main" val="0"/>
@@ -3989,7 +4073,1474 @@
           <p:nvPr/>
         </p:nvPicPr>
         <p:blipFill>
-          <a:blip r:embed="rId5" cstate="print">
+          <a:blip r:embed="rId6" cstate="print">
+            <a:extLst>
+              <a:ext uri="{28A0092B-C50C-407E-A947-70E740481C1C}">
+                <a14:useLocalDpi xmlns:a14="http://schemas.microsoft.com/office/drawing/2010/main" val="0"/>
+              </a:ext>
+            </a:extLst>
+          </a:blip>
+          <a:stretch>
+            <a:fillRect/>
+          </a:stretch>
+        </p:blipFill>
+        <p:spPr>
+          <a:xfrm>
+            <a:off x="5359457" y="5064749"/>
+            <a:ext cx="279343" cy="279343"/>
+          </a:xfrm>
+          <a:prstGeom prst="rect">
+            <a:avLst/>
+          </a:prstGeom>
+        </p:spPr>
+      </p:pic>
+      <p:sp>
+        <p:nvSpPr>
+          <p:cNvPr id="10" name="Rounded Rectangle 9">
+            <a:hlinkClick r:id="rId7" action="ppaction://hlinksldjump"/>
+          </p:cNvPr>
+          <p:cNvSpPr/>
+          <p:nvPr/>
+        </p:nvSpPr>
+        <p:spPr>
+          <a:xfrm>
+            <a:off x="5493756" y="4450502"/>
+            <a:ext cx="1087972" cy="306663"/>
+          </a:xfrm>
+          <a:prstGeom prst="roundRect">
+            <a:avLst/>
+          </a:prstGeom>
+        </p:spPr>
+        <p:style>
+          <a:lnRef idx="1">
+            <a:schemeClr val="accent6"/>
+          </a:lnRef>
+          <a:fillRef idx="3">
+            <a:schemeClr val="accent6"/>
+          </a:fillRef>
+          <a:effectRef idx="2">
+            <a:schemeClr val="accent6"/>
+          </a:effectRef>
+          <a:fontRef idx="minor">
+            <a:schemeClr val="lt1"/>
+          </a:fontRef>
+        </p:style>
+        <p:txBody>
+          <a:bodyPr rtlCol="0" anchor="ctr"/>
+          <a:lstStyle/>
+          <a:p>
+            <a:pPr algn="ctr"/>
+            <a:r>
+              <a:rPr lang="en-US" dirty="0" smtClean="0"/>
+              <a:t>Done</a:t>
+            </a:r>
+            <a:endParaRPr lang="en-US" dirty="0"/>
+          </a:p>
+        </p:txBody>
+      </p:sp>
+    </p:spTree>
+    <p:extLst>
+      <p:ext uri="{BB962C8B-B14F-4D97-AF65-F5344CB8AC3E}">
+        <p14:creationId xmlns:p14="http://schemas.microsoft.com/office/powerpoint/2010/main" val="1436105132"/>
+      </p:ext>
+    </p:extLst>
+  </p:cSld>
+  <p:clrMapOvr>
+    <a:masterClrMapping/>
+  </p:clrMapOvr>
+  <p:timing>
+    <p:tnLst>
+      <p:par>
+        <p:cTn id="1" dur="indefinite" restart="never" nodeType="tmRoot"/>
+      </p:par>
+    </p:tnLst>
+  </p:timing>
+</p:sld>
+</file>
+
+<file path=ppt/slides/slide11.xml><?xml version="1.0" encoding="utf-8"?>
+<p:sld xmlns:a="http://schemas.openxmlformats.org/drawingml/2006/main" xmlns:r="http://schemas.openxmlformats.org/officeDocument/2006/relationships" xmlns:p="http://schemas.openxmlformats.org/presentationml/2006/main">
+  <p:cSld>
+    <p:spTree>
+      <p:nvGrpSpPr>
+        <p:cNvPr id="1" name=""/>
+        <p:cNvGrpSpPr/>
+        <p:nvPr/>
+      </p:nvGrpSpPr>
+      <p:grpSpPr>
+        <a:xfrm>
+          <a:off x="0" y="0"/>
+          <a:ext cx="0" cy="0"/>
+          <a:chOff x="0" y="0"/>
+          <a:chExt cx="0" cy="0"/>
+        </a:xfrm>
+      </p:grpSpPr>
+      <p:pic>
+        <p:nvPicPr>
+          <p:cNvPr id="2" name="Picture 1"/>
+          <p:cNvPicPr>
+            <a:picLocks noChangeAspect="1"/>
+          </p:cNvPicPr>
+          <p:nvPr/>
+        </p:nvPicPr>
+        <p:blipFill>
+          <a:blip r:embed="rId2"/>
+          <a:stretch>
+            <a:fillRect/>
+          </a:stretch>
+        </p:blipFill>
+        <p:spPr>
+          <a:xfrm>
+            <a:off x="4691062" y="557212"/>
+            <a:ext cx="2809875" cy="5743575"/>
+          </a:xfrm>
+          <a:prstGeom prst="rect">
+            <a:avLst/>
+          </a:prstGeom>
+        </p:spPr>
+      </p:pic>
+      <p:pic>
+        <p:nvPicPr>
+          <p:cNvPr id="6" name="Picture 5"/>
+          <p:cNvPicPr>
+            <a:picLocks noChangeAspect="1"/>
+          </p:cNvPicPr>
+          <p:nvPr/>
+        </p:nvPicPr>
+        <p:blipFill>
+          <a:blip r:embed="rId3"/>
+          <a:stretch>
+            <a:fillRect/>
+          </a:stretch>
+        </p:blipFill>
+        <p:spPr>
+          <a:xfrm>
+            <a:off x="6658963" y="1885052"/>
+            <a:ext cx="409575" cy="361950"/>
+          </a:xfrm>
+          <a:prstGeom prst="rect">
+            <a:avLst/>
+          </a:prstGeom>
+        </p:spPr>
+      </p:pic>
+      <p:pic>
+        <p:nvPicPr>
+          <p:cNvPr id="7" name="Picture 6"/>
+          <p:cNvPicPr>
+            <a:picLocks noChangeAspect="1"/>
+          </p:cNvPicPr>
+          <p:nvPr/>
+        </p:nvPicPr>
+        <p:blipFill>
+          <a:blip r:embed="rId3"/>
+          <a:stretch>
+            <a:fillRect/>
+          </a:stretch>
+        </p:blipFill>
+        <p:spPr>
+          <a:xfrm>
+            <a:off x="6658963" y="2333625"/>
+            <a:ext cx="409575" cy="361950"/>
+          </a:xfrm>
+          <a:prstGeom prst="rect">
+            <a:avLst/>
+          </a:prstGeom>
+        </p:spPr>
+      </p:pic>
+      <p:pic>
+        <p:nvPicPr>
+          <p:cNvPr id="8" name="Picture 7"/>
+          <p:cNvPicPr>
+            <a:picLocks noChangeAspect="1"/>
+          </p:cNvPicPr>
+          <p:nvPr/>
+        </p:nvPicPr>
+        <p:blipFill>
+          <a:blip r:embed="rId3"/>
+          <a:stretch>
+            <a:fillRect/>
+          </a:stretch>
+        </p:blipFill>
+        <p:spPr>
+          <a:xfrm>
+            <a:off x="6658962" y="3217203"/>
+            <a:ext cx="409575" cy="361950"/>
+          </a:xfrm>
+          <a:prstGeom prst="rect">
+            <a:avLst/>
+          </a:prstGeom>
+        </p:spPr>
+      </p:pic>
+      <p:pic>
+        <p:nvPicPr>
+          <p:cNvPr id="11" name="Picture 10"/>
+          <p:cNvPicPr>
+            <a:picLocks noChangeAspect="1"/>
+          </p:cNvPicPr>
+          <p:nvPr/>
+        </p:nvPicPr>
+        <p:blipFill>
+          <a:blip r:embed="rId3"/>
+          <a:stretch>
+            <a:fillRect/>
+          </a:stretch>
+        </p:blipFill>
+        <p:spPr>
+          <a:xfrm>
+            <a:off x="6670821" y="3662632"/>
+            <a:ext cx="409575" cy="361950"/>
+          </a:xfrm>
+          <a:prstGeom prst="rect">
+            <a:avLst/>
+          </a:prstGeom>
+        </p:spPr>
+      </p:pic>
+      <p:sp>
+        <p:nvSpPr>
+          <p:cNvPr id="12" name="Rounded Rectangle 11">
+            <a:hlinkClick r:id="rId4" action="ppaction://hlinksldjump"/>
+          </p:cNvPr>
+          <p:cNvSpPr/>
+          <p:nvPr/>
+        </p:nvSpPr>
+        <p:spPr>
+          <a:xfrm>
+            <a:off x="5248362" y="4361458"/>
+            <a:ext cx="1695273" cy="410802"/>
+          </a:xfrm>
+          <a:prstGeom prst="roundRect">
+            <a:avLst/>
+          </a:prstGeom>
+        </p:spPr>
+        <p:style>
+          <a:lnRef idx="2">
+            <a:schemeClr val="accent6"/>
+          </a:lnRef>
+          <a:fillRef idx="1">
+            <a:schemeClr val="lt1"/>
+          </a:fillRef>
+          <a:effectRef idx="0">
+            <a:schemeClr val="accent6"/>
+          </a:effectRef>
+          <a:fontRef idx="minor">
+            <a:schemeClr val="dk1"/>
+          </a:fontRef>
+        </p:style>
+        <p:txBody>
+          <a:bodyPr rtlCol="0" anchor="ctr"/>
+          <a:lstStyle/>
+          <a:p>
+            <a:pPr algn="ctr"/>
+            <a:r>
+              <a:rPr lang="en-US" sz="1600" dirty="0" smtClean="0"/>
+              <a:t>Confirmed</a:t>
+            </a:r>
+            <a:endParaRPr lang="en-US" sz="1600" dirty="0"/>
+          </a:p>
+        </p:txBody>
+      </p:sp>
+      <p:pic>
+        <p:nvPicPr>
+          <p:cNvPr id="13" name="Picture 12"/>
+          <p:cNvPicPr>
+            <a:picLocks noChangeAspect="1"/>
+          </p:cNvPicPr>
+          <p:nvPr/>
+        </p:nvPicPr>
+        <p:blipFill>
+          <a:blip r:embed="rId3"/>
+          <a:stretch>
+            <a:fillRect/>
+          </a:stretch>
+        </p:blipFill>
+        <p:spPr>
+          <a:xfrm>
+            <a:off x="6656089" y="2774382"/>
+            <a:ext cx="409575" cy="361950"/>
+          </a:xfrm>
+          <a:prstGeom prst="rect">
+            <a:avLst/>
+          </a:prstGeom>
+        </p:spPr>
+      </p:pic>
+      <p:graphicFrame>
+        <p:nvGraphicFramePr>
+          <p:cNvPr id="14" name="Table 13"/>
+          <p:cNvGraphicFramePr>
+            <a:graphicFrameLocks noGrp="1"/>
+          </p:cNvGraphicFramePr>
+          <p:nvPr>
+            <p:extLst>
+              <p:ext uri="{D42A27DB-BD31-4B8C-83A1-F6EECF244321}">
+                <p14:modId xmlns:p14="http://schemas.microsoft.com/office/powerpoint/2010/main" val="130076226"/>
+              </p:ext>
+            </p:extLst>
+          </p:nvPr>
+        </p:nvGraphicFramePr>
+        <p:xfrm>
+          <a:off x="4956357" y="1409780"/>
+          <a:ext cx="2281205" cy="3103611"/>
+        </p:xfrm>
+        <a:graphic>
+          <a:graphicData uri="http://schemas.openxmlformats.org/drawingml/2006/table">
+            <a:tbl>
+              <a:tblPr firstRow="1" bandRow="1">
+                <a:tableStyleId>{2D5ABB26-0587-4C30-8999-92F81FD0307C}</a:tableStyleId>
+              </a:tblPr>
+              <a:tblGrid>
+                <a:gridCol w="780209"/>
+                <a:gridCol w="802257"/>
+                <a:gridCol w="698739"/>
+              </a:tblGrid>
+              <a:tr h="443373">
+                <a:tc gridSpan="3">
+                  <a:txBody>
+                    <a:bodyPr/>
+                    <a:lstStyle/>
+                    <a:p>
+                      <a:pPr algn="ctr"/>
+                      <a:r>
+                        <a:rPr lang="en-US" dirty="0" smtClean="0"/>
+                        <a:t>Week 33</a:t>
+                      </a:r>
+                      <a:endParaRPr lang="en-US" dirty="0"/>
+                    </a:p>
+                  </a:txBody>
+                  <a:tcPr>
+                    <a:lnB w="12700" cap="flat" cmpd="sng" algn="ctr">
+                      <a:solidFill>
+                        <a:schemeClr val="tx1"/>
+                      </a:solidFill>
+                      <a:prstDash val="solid"/>
+                      <a:round/>
+                      <a:headEnd type="none" w="med" len="med"/>
+                      <a:tailEnd type="none" w="med" len="med"/>
+                    </a:lnB>
+                  </a:tcPr>
+                </a:tc>
+                <a:tc hMerge="1">
+                  <a:txBody>
+                    <a:bodyPr/>
+                    <a:lstStyle/>
+                    <a:p>
+                      <a:endParaRPr lang="en-US"/>
+                    </a:p>
+                  </a:txBody>
+                  <a:tcPr/>
+                </a:tc>
+                <a:tc hMerge="1">
+                  <a:txBody>
+                    <a:bodyPr/>
+                    <a:lstStyle/>
+                    <a:p>
+                      <a:endParaRPr lang="en-US"/>
+                    </a:p>
+                  </a:txBody>
+                  <a:tcPr/>
+                </a:tc>
+              </a:tr>
+              <a:tr h="443373">
+                <a:tc>
+                  <a:txBody>
+                    <a:bodyPr/>
+                    <a:lstStyle/>
+                    <a:p>
+                      <a:r>
+                        <a:rPr lang="en-US" dirty="0" smtClean="0"/>
+                        <a:t>Mon</a:t>
+                      </a:r>
+                      <a:endParaRPr lang="en-US" dirty="0"/>
+                    </a:p>
+                  </a:txBody>
+                  <a:tcPr>
+                    <a:lnL w="12700" cap="flat" cmpd="sng" algn="ctr">
+                      <a:solidFill>
+                        <a:schemeClr val="tx1"/>
+                      </a:solidFill>
+                      <a:prstDash val="solid"/>
+                      <a:round/>
+                      <a:headEnd type="none" w="med" len="med"/>
+                      <a:tailEnd type="none" w="med" len="med"/>
+                    </a:lnL>
+                    <a:lnR w="12700" cap="flat" cmpd="sng" algn="ctr">
+                      <a:solidFill>
+                        <a:schemeClr val="tx1"/>
+                      </a:solidFill>
+                      <a:prstDash val="solid"/>
+                      <a:round/>
+                      <a:headEnd type="none" w="med" len="med"/>
+                      <a:tailEnd type="none" w="med" len="med"/>
+                    </a:lnR>
+                    <a:lnT w="12700" cap="flat" cmpd="sng" algn="ctr">
+                      <a:solidFill>
+                        <a:schemeClr val="tx1"/>
+                      </a:solidFill>
+                      <a:prstDash val="solid"/>
+                      <a:round/>
+                      <a:headEnd type="none" w="med" len="med"/>
+                      <a:tailEnd type="none" w="med" len="med"/>
+                    </a:lnT>
+                    <a:lnB w="12700" cap="flat" cmpd="sng" algn="ctr">
+                      <a:solidFill>
+                        <a:schemeClr val="tx1"/>
+                      </a:solidFill>
+                      <a:prstDash val="solid"/>
+                      <a:round/>
+                      <a:headEnd type="none" w="med" len="med"/>
+                      <a:tailEnd type="none" w="med" len="med"/>
+                    </a:lnB>
+                  </a:tcPr>
+                </a:tc>
+                <a:tc>
+                  <a:txBody>
+                    <a:bodyPr/>
+                    <a:lstStyle/>
+                    <a:p>
+                      <a:pPr algn="r"/>
+                      <a:r>
+                        <a:rPr lang="en-US" sz="1800" kern="1200" dirty="0" smtClean="0">
+                          <a:solidFill>
+                            <a:schemeClr val="tx1"/>
+                          </a:solidFill>
+                          <a:latin typeface="+mn-lt"/>
+                          <a:ea typeface="+mn-ea"/>
+                          <a:cs typeface="+mn-cs"/>
+                        </a:rPr>
+                        <a:t>8h</a:t>
+                      </a:r>
+                      <a:endParaRPr lang="en-US" sz="1800" kern="1200" dirty="0">
+                        <a:solidFill>
+                          <a:schemeClr val="tx1"/>
+                        </a:solidFill>
+                        <a:latin typeface="+mn-lt"/>
+                        <a:ea typeface="+mn-ea"/>
+                        <a:cs typeface="+mn-cs"/>
+                      </a:endParaRPr>
+                    </a:p>
+                  </a:txBody>
+                  <a:tcPr>
+                    <a:lnL w="12700" cap="flat" cmpd="sng" algn="ctr">
+                      <a:solidFill>
+                        <a:schemeClr val="tx1"/>
+                      </a:solidFill>
+                      <a:prstDash val="solid"/>
+                      <a:round/>
+                      <a:headEnd type="none" w="med" len="med"/>
+                      <a:tailEnd type="none" w="med" len="med"/>
+                    </a:lnL>
+                    <a:lnR w="12700" cap="flat" cmpd="sng" algn="ctr">
+                      <a:solidFill>
+                        <a:schemeClr val="tx1"/>
+                      </a:solidFill>
+                      <a:prstDash val="solid"/>
+                      <a:round/>
+                      <a:headEnd type="none" w="med" len="med"/>
+                      <a:tailEnd type="none" w="med" len="med"/>
+                    </a:lnR>
+                    <a:lnT w="12700" cap="flat" cmpd="sng" algn="ctr">
+                      <a:solidFill>
+                        <a:schemeClr val="tx1"/>
+                      </a:solidFill>
+                      <a:prstDash val="solid"/>
+                      <a:round/>
+                      <a:headEnd type="none" w="med" len="med"/>
+                      <a:tailEnd type="none" w="med" len="med"/>
+                    </a:lnT>
+                    <a:lnB w="12700" cap="flat" cmpd="sng" algn="ctr">
+                      <a:solidFill>
+                        <a:schemeClr val="tx1"/>
+                      </a:solidFill>
+                      <a:prstDash val="solid"/>
+                      <a:round/>
+                      <a:headEnd type="none" w="med" len="med"/>
+                      <a:tailEnd type="none" w="med" len="med"/>
+                    </a:lnB>
+                  </a:tcPr>
+                </a:tc>
+                <a:tc>
+                  <a:txBody>
+                    <a:bodyPr/>
+                    <a:lstStyle/>
+                    <a:p>
+                      <a:endParaRPr lang="en-US" sz="1800" kern="1200" dirty="0">
+                        <a:solidFill>
+                          <a:schemeClr val="tx1"/>
+                        </a:solidFill>
+                        <a:latin typeface="+mn-lt"/>
+                        <a:ea typeface="+mn-ea"/>
+                        <a:cs typeface="+mn-cs"/>
+                      </a:endParaRPr>
+                    </a:p>
+                  </a:txBody>
+                  <a:tcPr>
+                    <a:lnL w="12700" cap="flat" cmpd="sng" algn="ctr">
+                      <a:solidFill>
+                        <a:schemeClr val="tx1"/>
+                      </a:solidFill>
+                      <a:prstDash val="solid"/>
+                      <a:round/>
+                      <a:headEnd type="none" w="med" len="med"/>
+                      <a:tailEnd type="none" w="med" len="med"/>
+                    </a:lnL>
+                    <a:lnR w="12700" cap="flat" cmpd="sng" algn="ctr">
+                      <a:solidFill>
+                        <a:schemeClr val="tx1"/>
+                      </a:solidFill>
+                      <a:prstDash val="solid"/>
+                      <a:round/>
+                      <a:headEnd type="none" w="med" len="med"/>
+                      <a:tailEnd type="none" w="med" len="med"/>
+                    </a:lnR>
+                    <a:lnT w="12700" cap="flat" cmpd="sng" algn="ctr">
+                      <a:solidFill>
+                        <a:schemeClr val="tx1"/>
+                      </a:solidFill>
+                      <a:prstDash val="solid"/>
+                      <a:round/>
+                      <a:headEnd type="none" w="med" len="med"/>
+                      <a:tailEnd type="none" w="med" len="med"/>
+                    </a:lnT>
+                    <a:lnB w="12700" cap="flat" cmpd="sng" algn="ctr">
+                      <a:solidFill>
+                        <a:schemeClr val="tx1"/>
+                      </a:solidFill>
+                      <a:prstDash val="solid"/>
+                      <a:round/>
+                      <a:headEnd type="none" w="med" len="med"/>
+                      <a:tailEnd type="none" w="med" len="med"/>
+                    </a:lnB>
+                  </a:tcPr>
+                </a:tc>
+              </a:tr>
+              <a:tr h="443373">
+                <a:tc>
+                  <a:txBody>
+                    <a:bodyPr/>
+                    <a:lstStyle/>
+                    <a:p>
+                      <a:r>
+                        <a:rPr lang="en-US" dirty="0" smtClean="0"/>
+                        <a:t>Tue</a:t>
+                      </a:r>
+                      <a:endParaRPr lang="en-US" dirty="0"/>
+                    </a:p>
+                  </a:txBody>
+                  <a:tcPr>
+                    <a:lnL w="12700" cap="flat" cmpd="sng" algn="ctr">
+                      <a:solidFill>
+                        <a:schemeClr val="tx1"/>
+                      </a:solidFill>
+                      <a:prstDash val="solid"/>
+                      <a:round/>
+                      <a:headEnd type="none" w="med" len="med"/>
+                      <a:tailEnd type="none" w="med" len="med"/>
+                    </a:lnL>
+                    <a:lnR w="12700" cap="flat" cmpd="sng" algn="ctr">
+                      <a:solidFill>
+                        <a:schemeClr val="tx1"/>
+                      </a:solidFill>
+                      <a:prstDash val="solid"/>
+                      <a:round/>
+                      <a:headEnd type="none" w="med" len="med"/>
+                      <a:tailEnd type="none" w="med" len="med"/>
+                    </a:lnR>
+                    <a:lnT w="12700" cap="flat" cmpd="sng" algn="ctr">
+                      <a:solidFill>
+                        <a:schemeClr val="tx1"/>
+                      </a:solidFill>
+                      <a:prstDash val="solid"/>
+                      <a:round/>
+                      <a:headEnd type="none" w="med" len="med"/>
+                      <a:tailEnd type="none" w="med" len="med"/>
+                    </a:lnT>
+                    <a:lnB w="12700" cap="flat" cmpd="sng" algn="ctr">
+                      <a:solidFill>
+                        <a:schemeClr val="tx1"/>
+                      </a:solidFill>
+                      <a:prstDash val="solid"/>
+                      <a:round/>
+                      <a:headEnd type="none" w="med" len="med"/>
+                      <a:tailEnd type="none" w="med" len="med"/>
+                    </a:lnB>
+                  </a:tcPr>
+                </a:tc>
+                <a:tc>
+                  <a:txBody>
+                    <a:bodyPr/>
+                    <a:lstStyle/>
+                    <a:p>
+                      <a:pPr algn="r"/>
+                      <a:r>
+                        <a:rPr lang="en-US" sz="1800" kern="1200" dirty="0" smtClean="0">
+                          <a:solidFill>
+                            <a:schemeClr val="tx1"/>
+                          </a:solidFill>
+                          <a:latin typeface="+mn-lt"/>
+                          <a:ea typeface="+mn-ea"/>
+                          <a:cs typeface="+mn-cs"/>
+                        </a:rPr>
+                        <a:t>6h</a:t>
+                      </a:r>
+                      <a:endParaRPr lang="en-US" sz="1800" kern="1200" dirty="0">
+                        <a:solidFill>
+                          <a:schemeClr val="tx1"/>
+                        </a:solidFill>
+                        <a:latin typeface="+mn-lt"/>
+                        <a:ea typeface="+mn-ea"/>
+                        <a:cs typeface="+mn-cs"/>
+                      </a:endParaRPr>
+                    </a:p>
+                  </a:txBody>
+                  <a:tcPr>
+                    <a:lnL w="12700" cap="flat" cmpd="sng" algn="ctr">
+                      <a:solidFill>
+                        <a:schemeClr val="tx1"/>
+                      </a:solidFill>
+                      <a:prstDash val="solid"/>
+                      <a:round/>
+                      <a:headEnd type="none" w="med" len="med"/>
+                      <a:tailEnd type="none" w="med" len="med"/>
+                    </a:lnL>
+                    <a:lnR w="12700" cap="flat" cmpd="sng" algn="ctr">
+                      <a:solidFill>
+                        <a:schemeClr val="tx1"/>
+                      </a:solidFill>
+                      <a:prstDash val="solid"/>
+                      <a:round/>
+                      <a:headEnd type="none" w="med" len="med"/>
+                      <a:tailEnd type="none" w="med" len="med"/>
+                    </a:lnR>
+                    <a:lnT w="12700" cap="flat" cmpd="sng" algn="ctr">
+                      <a:solidFill>
+                        <a:schemeClr val="tx1"/>
+                      </a:solidFill>
+                      <a:prstDash val="solid"/>
+                      <a:round/>
+                      <a:headEnd type="none" w="med" len="med"/>
+                      <a:tailEnd type="none" w="med" len="med"/>
+                    </a:lnT>
+                    <a:lnB w="12700" cap="flat" cmpd="sng" algn="ctr">
+                      <a:solidFill>
+                        <a:schemeClr val="tx1"/>
+                      </a:solidFill>
+                      <a:prstDash val="solid"/>
+                      <a:round/>
+                      <a:headEnd type="none" w="med" len="med"/>
+                      <a:tailEnd type="none" w="med" len="med"/>
+                    </a:lnB>
+                  </a:tcPr>
+                </a:tc>
+                <a:tc>
+                  <a:txBody>
+                    <a:bodyPr/>
+                    <a:lstStyle/>
+                    <a:p>
+                      <a:endParaRPr lang="en-US" sz="1800" kern="1200" dirty="0">
+                        <a:solidFill>
+                          <a:schemeClr val="tx1"/>
+                        </a:solidFill>
+                        <a:latin typeface="+mn-lt"/>
+                        <a:ea typeface="+mn-ea"/>
+                        <a:cs typeface="+mn-cs"/>
+                      </a:endParaRPr>
+                    </a:p>
+                  </a:txBody>
+                  <a:tcPr>
+                    <a:lnL w="12700" cap="flat" cmpd="sng" algn="ctr">
+                      <a:solidFill>
+                        <a:schemeClr val="tx1"/>
+                      </a:solidFill>
+                      <a:prstDash val="solid"/>
+                      <a:round/>
+                      <a:headEnd type="none" w="med" len="med"/>
+                      <a:tailEnd type="none" w="med" len="med"/>
+                    </a:lnL>
+                    <a:lnR w="12700" cap="flat" cmpd="sng" algn="ctr">
+                      <a:solidFill>
+                        <a:schemeClr val="tx1"/>
+                      </a:solidFill>
+                      <a:prstDash val="solid"/>
+                      <a:round/>
+                      <a:headEnd type="none" w="med" len="med"/>
+                      <a:tailEnd type="none" w="med" len="med"/>
+                    </a:lnR>
+                    <a:lnT w="12700" cap="flat" cmpd="sng" algn="ctr">
+                      <a:solidFill>
+                        <a:schemeClr val="tx1"/>
+                      </a:solidFill>
+                      <a:prstDash val="solid"/>
+                      <a:round/>
+                      <a:headEnd type="none" w="med" len="med"/>
+                      <a:tailEnd type="none" w="med" len="med"/>
+                    </a:lnT>
+                    <a:lnB w="12700" cap="flat" cmpd="sng" algn="ctr">
+                      <a:solidFill>
+                        <a:schemeClr val="tx1"/>
+                      </a:solidFill>
+                      <a:prstDash val="solid"/>
+                      <a:round/>
+                      <a:headEnd type="none" w="med" len="med"/>
+                      <a:tailEnd type="none" w="med" len="med"/>
+                    </a:lnB>
+                  </a:tcPr>
+                </a:tc>
+              </a:tr>
+              <a:tr h="443373">
+                <a:tc>
+                  <a:txBody>
+                    <a:bodyPr/>
+                    <a:lstStyle/>
+                    <a:p>
+                      <a:r>
+                        <a:rPr lang="en-US" dirty="0" smtClean="0"/>
+                        <a:t>Wed</a:t>
+                      </a:r>
+                      <a:endParaRPr lang="en-US" dirty="0"/>
+                    </a:p>
+                  </a:txBody>
+                  <a:tcPr>
+                    <a:lnL w="12700" cap="flat" cmpd="sng" algn="ctr">
+                      <a:solidFill>
+                        <a:schemeClr val="tx1"/>
+                      </a:solidFill>
+                      <a:prstDash val="solid"/>
+                      <a:round/>
+                      <a:headEnd type="none" w="med" len="med"/>
+                      <a:tailEnd type="none" w="med" len="med"/>
+                    </a:lnL>
+                    <a:lnR w="12700" cap="flat" cmpd="sng" algn="ctr">
+                      <a:solidFill>
+                        <a:schemeClr val="tx1"/>
+                      </a:solidFill>
+                      <a:prstDash val="solid"/>
+                      <a:round/>
+                      <a:headEnd type="none" w="med" len="med"/>
+                      <a:tailEnd type="none" w="med" len="med"/>
+                    </a:lnR>
+                    <a:lnT w="12700" cap="flat" cmpd="sng" algn="ctr">
+                      <a:solidFill>
+                        <a:schemeClr val="tx1"/>
+                      </a:solidFill>
+                      <a:prstDash val="solid"/>
+                      <a:round/>
+                      <a:headEnd type="none" w="med" len="med"/>
+                      <a:tailEnd type="none" w="med" len="med"/>
+                    </a:lnT>
+                    <a:lnB w="12700" cap="flat" cmpd="sng" algn="ctr">
+                      <a:solidFill>
+                        <a:schemeClr val="tx1"/>
+                      </a:solidFill>
+                      <a:prstDash val="solid"/>
+                      <a:round/>
+                      <a:headEnd type="none" w="med" len="med"/>
+                      <a:tailEnd type="none" w="med" len="med"/>
+                    </a:lnB>
+                  </a:tcPr>
+                </a:tc>
+                <a:tc>
+                  <a:txBody>
+                    <a:bodyPr/>
+                    <a:lstStyle/>
+                    <a:p>
+                      <a:pPr algn="r"/>
+                      <a:r>
+                        <a:rPr lang="en-US" sz="1800" kern="1200" dirty="0" smtClean="0">
+                          <a:solidFill>
+                            <a:schemeClr val="tx1"/>
+                          </a:solidFill>
+                          <a:latin typeface="+mn-lt"/>
+                          <a:ea typeface="+mn-ea"/>
+                          <a:cs typeface="+mn-cs"/>
+                        </a:rPr>
+                        <a:t>7.5h</a:t>
+                      </a:r>
+                      <a:endParaRPr lang="en-US" sz="1800" kern="1200" dirty="0">
+                        <a:solidFill>
+                          <a:schemeClr val="tx1"/>
+                        </a:solidFill>
+                        <a:latin typeface="+mn-lt"/>
+                        <a:ea typeface="+mn-ea"/>
+                        <a:cs typeface="+mn-cs"/>
+                      </a:endParaRPr>
+                    </a:p>
+                  </a:txBody>
+                  <a:tcPr>
+                    <a:lnL w="12700" cap="flat" cmpd="sng" algn="ctr">
+                      <a:solidFill>
+                        <a:schemeClr val="tx1"/>
+                      </a:solidFill>
+                      <a:prstDash val="solid"/>
+                      <a:round/>
+                      <a:headEnd type="none" w="med" len="med"/>
+                      <a:tailEnd type="none" w="med" len="med"/>
+                    </a:lnL>
+                    <a:lnR w="12700" cap="flat" cmpd="sng" algn="ctr">
+                      <a:solidFill>
+                        <a:schemeClr val="tx1"/>
+                      </a:solidFill>
+                      <a:prstDash val="solid"/>
+                      <a:round/>
+                      <a:headEnd type="none" w="med" len="med"/>
+                      <a:tailEnd type="none" w="med" len="med"/>
+                    </a:lnR>
+                    <a:lnT w="12700" cap="flat" cmpd="sng" algn="ctr">
+                      <a:solidFill>
+                        <a:schemeClr val="tx1"/>
+                      </a:solidFill>
+                      <a:prstDash val="solid"/>
+                      <a:round/>
+                      <a:headEnd type="none" w="med" len="med"/>
+                      <a:tailEnd type="none" w="med" len="med"/>
+                    </a:lnT>
+                    <a:lnB w="12700" cap="flat" cmpd="sng" algn="ctr">
+                      <a:solidFill>
+                        <a:schemeClr val="tx1"/>
+                      </a:solidFill>
+                      <a:prstDash val="solid"/>
+                      <a:round/>
+                      <a:headEnd type="none" w="med" len="med"/>
+                      <a:tailEnd type="none" w="med" len="med"/>
+                    </a:lnB>
+                  </a:tcPr>
+                </a:tc>
+                <a:tc>
+                  <a:txBody>
+                    <a:bodyPr/>
+                    <a:lstStyle/>
+                    <a:p>
+                      <a:endParaRPr lang="en-US" sz="1800" kern="1200" dirty="0">
+                        <a:solidFill>
+                          <a:schemeClr val="tx1"/>
+                        </a:solidFill>
+                        <a:latin typeface="+mn-lt"/>
+                        <a:ea typeface="+mn-ea"/>
+                        <a:cs typeface="+mn-cs"/>
+                      </a:endParaRPr>
+                    </a:p>
+                  </a:txBody>
+                  <a:tcPr>
+                    <a:lnL w="12700" cap="flat" cmpd="sng" algn="ctr">
+                      <a:solidFill>
+                        <a:schemeClr val="tx1"/>
+                      </a:solidFill>
+                      <a:prstDash val="solid"/>
+                      <a:round/>
+                      <a:headEnd type="none" w="med" len="med"/>
+                      <a:tailEnd type="none" w="med" len="med"/>
+                    </a:lnL>
+                    <a:lnR w="12700" cap="flat" cmpd="sng" algn="ctr">
+                      <a:solidFill>
+                        <a:schemeClr val="tx1"/>
+                      </a:solidFill>
+                      <a:prstDash val="solid"/>
+                      <a:round/>
+                      <a:headEnd type="none" w="med" len="med"/>
+                      <a:tailEnd type="none" w="med" len="med"/>
+                    </a:lnR>
+                    <a:lnT w="12700" cap="flat" cmpd="sng" algn="ctr">
+                      <a:solidFill>
+                        <a:schemeClr val="tx1"/>
+                      </a:solidFill>
+                      <a:prstDash val="solid"/>
+                      <a:round/>
+                      <a:headEnd type="none" w="med" len="med"/>
+                      <a:tailEnd type="none" w="med" len="med"/>
+                    </a:lnT>
+                    <a:lnB w="12700" cap="flat" cmpd="sng" algn="ctr">
+                      <a:solidFill>
+                        <a:schemeClr val="tx1"/>
+                      </a:solidFill>
+                      <a:prstDash val="solid"/>
+                      <a:round/>
+                      <a:headEnd type="none" w="med" len="med"/>
+                      <a:tailEnd type="none" w="med" len="med"/>
+                    </a:lnB>
+                  </a:tcPr>
+                </a:tc>
+              </a:tr>
+              <a:tr h="443373">
+                <a:tc>
+                  <a:txBody>
+                    <a:bodyPr/>
+                    <a:lstStyle/>
+                    <a:p>
+                      <a:r>
+                        <a:rPr lang="en-US" dirty="0" smtClean="0"/>
+                        <a:t>Thu</a:t>
+                      </a:r>
+                      <a:endParaRPr lang="en-US" dirty="0"/>
+                    </a:p>
+                  </a:txBody>
+                  <a:tcPr>
+                    <a:lnL w="12700" cap="flat" cmpd="sng" algn="ctr">
+                      <a:solidFill>
+                        <a:schemeClr val="tx1"/>
+                      </a:solidFill>
+                      <a:prstDash val="solid"/>
+                      <a:round/>
+                      <a:headEnd type="none" w="med" len="med"/>
+                      <a:tailEnd type="none" w="med" len="med"/>
+                    </a:lnL>
+                    <a:lnR w="12700" cap="flat" cmpd="sng" algn="ctr">
+                      <a:solidFill>
+                        <a:schemeClr val="tx1"/>
+                      </a:solidFill>
+                      <a:prstDash val="solid"/>
+                      <a:round/>
+                      <a:headEnd type="none" w="med" len="med"/>
+                      <a:tailEnd type="none" w="med" len="med"/>
+                    </a:lnR>
+                    <a:lnT w="12700" cap="flat" cmpd="sng" algn="ctr">
+                      <a:solidFill>
+                        <a:schemeClr val="tx1"/>
+                      </a:solidFill>
+                      <a:prstDash val="solid"/>
+                      <a:round/>
+                      <a:headEnd type="none" w="med" len="med"/>
+                      <a:tailEnd type="none" w="med" len="med"/>
+                    </a:lnT>
+                    <a:lnB w="12700" cap="flat" cmpd="sng" algn="ctr">
+                      <a:solidFill>
+                        <a:schemeClr val="tx1"/>
+                      </a:solidFill>
+                      <a:prstDash val="solid"/>
+                      <a:round/>
+                      <a:headEnd type="none" w="med" len="med"/>
+                      <a:tailEnd type="none" w="med" len="med"/>
+                    </a:lnB>
+                  </a:tcPr>
+                </a:tc>
+                <a:tc>
+                  <a:txBody>
+                    <a:bodyPr/>
+                    <a:lstStyle/>
+                    <a:p>
+                      <a:pPr algn="r"/>
+                      <a:r>
+                        <a:rPr lang="en-US" sz="1800" kern="1200" dirty="0" smtClean="0">
+                          <a:solidFill>
+                            <a:schemeClr val="tx1"/>
+                          </a:solidFill>
+                          <a:latin typeface="+mn-lt"/>
+                          <a:ea typeface="+mn-ea"/>
+                          <a:cs typeface="+mn-cs"/>
+                        </a:rPr>
+                        <a:t>8h</a:t>
+                      </a:r>
+                      <a:endParaRPr lang="en-US" sz="1800" kern="1200" dirty="0">
+                        <a:solidFill>
+                          <a:schemeClr val="tx1"/>
+                        </a:solidFill>
+                        <a:latin typeface="+mn-lt"/>
+                        <a:ea typeface="+mn-ea"/>
+                        <a:cs typeface="+mn-cs"/>
+                      </a:endParaRPr>
+                    </a:p>
+                  </a:txBody>
+                  <a:tcPr>
+                    <a:lnL w="12700" cap="flat" cmpd="sng" algn="ctr">
+                      <a:solidFill>
+                        <a:schemeClr val="tx1"/>
+                      </a:solidFill>
+                      <a:prstDash val="solid"/>
+                      <a:round/>
+                      <a:headEnd type="none" w="med" len="med"/>
+                      <a:tailEnd type="none" w="med" len="med"/>
+                    </a:lnL>
+                    <a:lnR w="12700" cap="flat" cmpd="sng" algn="ctr">
+                      <a:solidFill>
+                        <a:schemeClr val="tx1"/>
+                      </a:solidFill>
+                      <a:prstDash val="solid"/>
+                      <a:round/>
+                      <a:headEnd type="none" w="med" len="med"/>
+                      <a:tailEnd type="none" w="med" len="med"/>
+                    </a:lnR>
+                    <a:lnT w="12700" cap="flat" cmpd="sng" algn="ctr">
+                      <a:solidFill>
+                        <a:schemeClr val="tx1"/>
+                      </a:solidFill>
+                      <a:prstDash val="solid"/>
+                      <a:round/>
+                      <a:headEnd type="none" w="med" len="med"/>
+                      <a:tailEnd type="none" w="med" len="med"/>
+                    </a:lnT>
+                    <a:lnB w="12700" cap="flat" cmpd="sng" algn="ctr">
+                      <a:solidFill>
+                        <a:schemeClr val="tx1"/>
+                      </a:solidFill>
+                      <a:prstDash val="solid"/>
+                      <a:round/>
+                      <a:headEnd type="none" w="med" len="med"/>
+                      <a:tailEnd type="none" w="med" len="med"/>
+                    </a:lnB>
+                  </a:tcPr>
+                </a:tc>
+                <a:tc>
+                  <a:txBody>
+                    <a:bodyPr/>
+                    <a:lstStyle/>
+                    <a:p>
+                      <a:endParaRPr lang="en-US" sz="1800" kern="1200" dirty="0">
+                        <a:solidFill>
+                          <a:schemeClr val="tx1"/>
+                        </a:solidFill>
+                        <a:latin typeface="+mn-lt"/>
+                        <a:ea typeface="+mn-ea"/>
+                        <a:cs typeface="+mn-cs"/>
+                      </a:endParaRPr>
+                    </a:p>
+                  </a:txBody>
+                  <a:tcPr>
+                    <a:lnL w="12700" cap="flat" cmpd="sng" algn="ctr">
+                      <a:solidFill>
+                        <a:schemeClr val="tx1"/>
+                      </a:solidFill>
+                      <a:prstDash val="solid"/>
+                      <a:round/>
+                      <a:headEnd type="none" w="med" len="med"/>
+                      <a:tailEnd type="none" w="med" len="med"/>
+                    </a:lnL>
+                    <a:lnR w="12700" cap="flat" cmpd="sng" algn="ctr">
+                      <a:solidFill>
+                        <a:schemeClr val="tx1"/>
+                      </a:solidFill>
+                      <a:prstDash val="solid"/>
+                      <a:round/>
+                      <a:headEnd type="none" w="med" len="med"/>
+                      <a:tailEnd type="none" w="med" len="med"/>
+                    </a:lnR>
+                    <a:lnT w="12700" cap="flat" cmpd="sng" algn="ctr">
+                      <a:solidFill>
+                        <a:schemeClr val="tx1"/>
+                      </a:solidFill>
+                      <a:prstDash val="solid"/>
+                      <a:round/>
+                      <a:headEnd type="none" w="med" len="med"/>
+                      <a:tailEnd type="none" w="med" len="med"/>
+                    </a:lnT>
+                    <a:lnB w="12700" cap="flat" cmpd="sng" algn="ctr">
+                      <a:solidFill>
+                        <a:schemeClr val="tx1"/>
+                      </a:solidFill>
+                      <a:prstDash val="solid"/>
+                      <a:round/>
+                      <a:headEnd type="none" w="med" len="med"/>
+                      <a:tailEnd type="none" w="med" len="med"/>
+                    </a:lnB>
+                  </a:tcPr>
+                </a:tc>
+              </a:tr>
+              <a:tr h="443373">
+                <a:tc>
+                  <a:txBody>
+                    <a:bodyPr/>
+                    <a:lstStyle/>
+                    <a:p>
+                      <a:r>
+                        <a:rPr lang="en-US" dirty="0" smtClean="0"/>
+                        <a:t>Fri</a:t>
+                      </a:r>
+                      <a:endParaRPr lang="en-US" dirty="0"/>
+                    </a:p>
+                  </a:txBody>
+                  <a:tcPr>
+                    <a:lnL w="12700" cap="flat" cmpd="sng" algn="ctr">
+                      <a:solidFill>
+                        <a:schemeClr val="tx1"/>
+                      </a:solidFill>
+                      <a:prstDash val="solid"/>
+                      <a:round/>
+                      <a:headEnd type="none" w="med" len="med"/>
+                      <a:tailEnd type="none" w="med" len="med"/>
+                    </a:lnL>
+                    <a:lnR w="12700" cap="flat" cmpd="sng" algn="ctr">
+                      <a:solidFill>
+                        <a:schemeClr val="tx1"/>
+                      </a:solidFill>
+                      <a:prstDash val="solid"/>
+                      <a:round/>
+                      <a:headEnd type="none" w="med" len="med"/>
+                      <a:tailEnd type="none" w="med" len="med"/>
+                    </a:lnR>
+                    <a:lnT w="12700" cap="flat" cmpd="sng" algn="ctr">
+                      <a:solidFill>
+                        <a:schemeClr val="tx1"/>
+                      </a:solidFill>
+                      <a:prstDash val="solid"/>
+                      <a:round/>
+                      <a:headEnd type="none" w="med" len="med"/>
+                      <a:tailEnd type="none" w="med" len="med"/>
+                    </a:lnT>
+                    <a:lnB w="12700" cap="flat" cmpd="sng" algn="ctr">
+                      <a:solidFill>
+                        <a:schemeClr val="tx1"/>
+                      </a:solidFill>
+                      <a:prstDash val="solid"/>
+                      <a:round/>
+                      <a:headEnd type="none" w="med" len="med"/>
+                      <a:tailEnd type="none" w="med" len="med"/>
+                    </a:lnB>
+                  </a:tcPr>
+                </a:tc>
+                <a:tc>
+                  <a:txBody>
+                    <a:bodyPr/>
+                    <a:lstStyle/>
+                    <a:p>
+                      <a:pPr algn="r"/>
+                      <a:r>
+                        <a:rPr lang="en-US" sz="1800" kern="1200" dirty="0" smtClean="0">
+                          <a:solidFill>
+                            <a:schemeClr val="tx1"/>
+                          </a:solidFill>
+                          <a:latin typeface="+mn-lt"/>
+                          <a:ea typeface="+mn-ea"/>
+                          <a:cs typeface="+mn-cs"/>
+                        </a:rPr>
+                        <a:t>8h</a:t>
+                      </a:r>
+                      <a:endParaRPr lang="en-US" sz="1800" kern="1200" dirty="0">
+                        <a:solidFill>
+                          <a:schemeClr val="tx1"/>
+                        </a:solidFill>
+                        <a:latin typeface="+mn-lt"/>
+                        <a:ea typeface="+mn-ea"/>
+                        <a:cs typeface="+mn-cs"/>
+                      </a:endParaRPr>
+                    </a:p>
+                  </a:txBody>
+                  <a:tcPr>
+                    <a:lnL w="12700" cap="flat" cmpd="sng" algn="ctr">
+                      <a:solidFill>
+                        <a:schemeClr val="tx1"/>
+                      </a:solidFill>
+                      <a:prstDash val="solid"/>
+                      <a:round/>
+                      <a:headEnd type="none" w="med" len="med"/>
+                      <a:tailEnd type="none" w="med" len="med"/>
+                    </a:lnL>
+                    <a:lnR w="12700" cap="flat" cmpd="sng" algn="ctr">
+                      <a:solidFill>
+                        <a:schemeClr val="tx1"/>
+                      </a:solidFill>
+                      <a:prstDash val="solid"/>
+                      <a:round/>
+                      <a:headEnd type="none" w="med" len="med"/>
+                      <a:tailEnd type="none" w="med" len="med"/>
+                    </a:lnR>
+                    <a:lnT w="12700" cap="flat" cmpd="sng" algn="ctr">
+                      <a:solidFill>
+                        <a:schemeClr val="tx1"/>
+                      </a:solidFill>
+                      <a:prstDash val="solid"/>
+                      <a:round/>
+                      <a:headEnd type="none" w="med" len="med"/>
+                      <a:tailEnd type="none" w="med" len="med"/>
+                    </a:lnT>
+                    <a:lnB w="12700" cap="flat" cmpd="sng" algn="ctr">
+                      <a:solidFill>
+                        <a:schemeClr val="tx1"/>
+                      </a:solidFill>
+                      <a:prstDash val="solid"/>
+                      <a:round/>
+                      <a:headEnd type="none" w="med" len="med"/>
+                      <a:tailEnd type="none" w="med" len="med"/>
+                    </a:lnB>
+                  </a:tcPr>
+                </a:tc>
+                <a:tc>
+                  <a:txBody>
+                    <a:bodyPr/>
+                    <a:lstStyle/>
+                    <a:p>
+                      <a:endParaRPr lang="en-US" sz="1800" kern="1200" dirty="0">
+                        <a:solidFill>
+                          <a:schemeClr val="tx1"/>
+                        </a:solidFill>
+                        <a:latin typeface="+mn-lt"/>
+                        <a:ea typeface="+mn-ea"/>
+                        <a:cs typeface="+mn-cs"/>
+                      </a:endParaRPr>
+                    </a:p>
+                  </a:txBody>
+                  <a:tcPr>
+                    <a:lnL w="12700" cap="flat" cmpd="sng" algn="ctr">
+                      <a:solidFill>
+                        <a:schemeClr val="tx1"/>
+                      </a:solidFill>
+                      <a:prstDash val="solid"/>
+                      <a:round/>
+                      <a:headEnd type="none" w="med" len="med"/>
+                      <a:tailEnd type="none" w="med" len="med"/>
+                    </a:lnL>
+                    <a:lnR w="12700" cap="flat" cmpd="sng" algn="ctr">
+                      <a:solidFill>
+                        <a:schemeClr val="tx1"/>
+                      </a:solidFill>
+                      <a:prstDash val="solid"/>
+                      <a:round/>
+                      <a:headEnd type="none" w="med" len="med"/>
+                      <a:tailEnd type="none" w="med" len="med"/>
+                    </a:lnR>
+                    <a:lnT w="12700" cap="flat" cmpd="sng" algn="ctr">
+                      <a:solidFill>
+                        <a:schemeClr val="tx1"/>
+                      </a:solidFill>
+                      <a:prstDash val="solid"/>
+                      <a:round/>
+                      <a:headEnd type="none" w="med" len="med"/>
+                      <a:tailEnd type="none" w="med" len="med"/>
+                    </a:lnT>
+                    <a:lnB w="12700" cap="flat" cmpd="sng" algn="ctr">
+                      <a:solidFill>
+                        <a:schemeClr val="tx1"/>
+                      </a:solidFill>
+                      <a:prstDash val="solid"/>
+                      <a:round/>
+                      <a:headEnd type="none" w="med" len="med"/>
+                      <a:tailEnd type="none" w="med" len="med"/>
+                    </a:lnB>
+                  </a:tcPr>
+                </a:tc>
+              </a:tr>
+              <a:tr h="443373">
+                <a:tc gridSpan="3">
+                  <a:txBody>
+                    <a:bodyPr/>
+                    <a:lstStyle/>
+                    <a:p>
+                      <a:endParaRPr lang="en-US" sz="1800" kern="1200" dirty="0">
+                        <a:solidFill>
+                          <a:schemeClr val="tx1"/>
+                        </a:solidFill>
+                        <a:latin typeface="+mn-lt"/>
+                        <a:ea typeface="+mn-ea"/>
+                        <a:cs typeface="+mn-cs"/>
+                      </a:endParaRPr>
+                    </a:p>
+                  </a:txBody>
+                  <a:tcPr>
+                    <a:lnT w="12700" cap="flat" cmpd="sng" algn="ctr">
+                      <a:solidFill>
+                        <a:schemeClr val="tx1"/>
+                      </a:solidFill>
+                      <a:prstDash val="solid"/>
+                      <a:round/>
+                      <a:headEnd type="none" w="med" len="med"/>
+                      <a:tailEnd type="none" w="med" len="med"/>
+                    </a:lnT>
+                  </a:tcPr>
+                </a:tc>
+                <a:tc hMerge="1">
+                  <a:txBody>
+                    <a:bodyPr/>
+                    <a:lstStyle/>
+                    <a:p>
+                      <a:endParaRPr lang="en-US"/>
+                    </a:p>
+                  </a:txBody>
+                  <a:tcPr/>
+                </a:tc>
+                <a:tc hMerge="1">
+                  <a:txBody>
+                    <a:bodyPr/>
+                    <a:lstStyle/>
+                    <a:p>
+                      <a:endParaRPr lang="en-US"/>
+                    </a:p>
+                  </a:txBody>
+                  <a:tcPr/>
+                </a:tc>
+              </a:tr>
+            </a:tbl>
+          </a:graphicData>
+        </a:graphic>
+      </p:graphicFrame>
+      <p:sp>
+        <p:nvSpPr>
+          <p:cNvPr id="10" name="Oval 9"/>
+          <p:cNvSpPr/>
+          <p:nvPr/>
+        </p:nvSpPr>
+        <p:spPr>
+          <a:xfrm>
+            <a:off x="6904892" y="1453660"/>
+            <a:ext cx="246185" cy="297120"/>
+          </a:xfrm>
+          <a:prstGeom prst="ellipse">
+            <a:avLst/>
+          </a:prstGeom>
+          <a:ln>
+            <a:solidFill>
+              <a:schemeClr val="tx1"/>
+            </a:solidFill>
+          </a:ln>
+        </p:spPr>
+        <p:style>
+          <a:lnRef idx="2">
+            <a:schemeClr val="accent6"/>
+          </a:lnRef>
+          <a:fillRef idx="1">
+            <a:schemeClr val="lt1"/>
+          </a:fillRef>
+          <a:effectRef idx="0">
+            <a:schemeClr val="accent6"/>
+          </a:effectRef>
+          <a:fontRef idx="minor">
+            <a:schemeClr val="dk1"/>
+          </a:fontRef>
+        </p:style>
+        <p:txBody>
+          <a:bodyPr rtlCol="0" anchor="ctr"/>
+          <a:lstStyle/>
+          <a:p>
+            <a:pPr algn="ctr"/>
+            <a:r>
+              <a:rPr lang="en-US" dirty="0" smtClean="0"/>
+              <a:t>+</a:t>
+            </a:r>
+            <a:endParaRPr lang="en-US" dirty="0"/>
+          </a:p>
+        </p:txBody>
+      </p:sp>
+      <p:sp>
+        <p:nvSpPr>
+          <p:cNvPr id="15" name="Oval 14"/>
+          <p:cNvSpPr/>
+          <p:nvPr/>
+        </p:nvSpPr>
+        <p:spPr>
+          <a:xfrm>
+            <a:off x="5064370" y="1465383"/>
+            <a:ext cx="236472" cy="285397"/>
+          </a:xfrm>
+          <a:prstGeom prst="ellipse">
+            <a:avLst/>
+          </a:prstGeom>
+          <a:ln>
+            <a:solidFill>
+              <a:schemeClr val="tx1"/>
+            </a:solidFill>
+          </a:ln>
+        </p:spPr>
+        <p:style>
+          <a:lnRef idx="2">
+            <a:schemeClr val="accent6"/>
+          </a:lnRef>
+          <a:fillRef idx="1">
+            <a:schemeClr val="lt1"/>
+          </a:fillRef>
+          <a:effectRef idx="0">
+            <a:schemeClr val="accent6"/>
+          </a:effectRef>
+          <a:fontRef idx="minor">
+            <a:schemeClr val="dk1"/>
+          </a:fontRef>
+        </p:style>
+        <p:txBody>
+          <a:bodyPr rtlCol="0" anchor="ctr"/>
+          <a:lstStyle/>
+          <a:p>
+            <a:pPr algn="ctr"/>
+            <a:r>
+              <a:rPr lang="en-US" dirty="0" smtClean="0"/>
+              <a:t>-</a:t>
+            </a:r>
+            <a:endParaRPr lang="en-US" dirty="0"/>
+          </a:p>
+        </p:txBody>
+      </p:sp>
+      <p:sp>
+        <p:nvSpPr>
+          <p:cNvPr id="16" name="Rectangle 15"/>
+          <p:cNvSpPr/>
+          <p:nvPr/>
+        </p:nvSpPr>
+        <p:spPr>
+          <a:xfrm>
+            <a:off x="4958863" y="4981766"/>
+            <a:ext cx="2250831" cy="433754"/>
+          </a:xfrm>
+          <a:prstGeom prst="rect">
+            <a:avLst/>
+          </a:prstGeom>
+          <a:solidFill>
+            <a:schemeClr val="bg1">
+              <a:lumMod val="95000"/>
+            </a:schemeClr>
+          </a:solidFill>
+          <a:ln>
+            <a:noFill/>
+          </a:ln>
+        </p:spPr>
+        <p:style>
+          <a:lnRef idx="2">
+            <a:schemeClr val="accent1">
+              <a:shade val="50000"/>
+            </a:schemeClr>
+          </a:lnRef>
+          <a:fillRef idx="1">
+            <a:schemeClr val="accent1"/>
+          </a:fillRef>
+          <a:effectRef idx="0">
+            <a:schemeClr val="accent1"/>
+          </a:effectRef>
+          <a:fontRef idx="minor">
+            <a:schemeClr val="lt1"/>
+          </a:fontRef>
+        </p:style>
+        <p:txBody>
+          <a:bodyPr rtlCol="0" anchor="ctr"/>
+          <a:lstStyle/>
+          <a:p>
+            <a:pPr algn="ctr"/>
+            <a:endParaRPr lang="en-US"/>
+          </a:p>
+        </p:txBody>
+      </p:sp>
+      <p:pic>
+        <p:nvPicPr>
+          <p:cNvPr id="17" name="Picture 16">
+            <a:hlinkClick r:id="rId5" action="ppaction://hlinksldjump"/>
+          </p:cNvPr>
+          <p:cNvPicPr>
+            <a:picLocks noChangeAspect="1"/>
+          </p:cNvPicPr>
+          <p:nvPr/>
+        </p:nvPicPr>
+        <p:blipFill>
+          <a:blip r:embed="rId6" cstate="print">
+            <a:extLst>
+              <a:ext uri="{28A0092B-C50C-407E-A947-70E740481C1C}">
+                <a14:useLocalDpi xmlns:a14="http://schemas.microsoft.com/office/drawing/2010/main" val="0"/>
+              </a:ext>
+            </a:extLst>
+          </a:blip>
+          <a:stretch>
+            <a:fillRect/>
+          </a:stretch>
+        </p:blipFill>
+        <p:spPr>
+          <a:xfrm>
+            <a:off x="6581728" y="5054003"/>
+            <a:ext cx="290089" cy="290089"/>
+          </a:xfrm>
+          <a:prstGeom prst="rect">
+            <a:avLst/>
+          </a:prstGeom>
+        </p:spPr>
+      </p:pic>
+      <p:pic>
+        <p:nvPicPr>
+          <p:cNvPr id="18" name="Picture 17"/>
+          <p:cNvPicPr>
+            <a:picLocks noChangeAspect="1"/>
+          </p:cNvPicPr>
+          <p:nvPr/>
+        </p:nvPicPr>
+        <p:blipFill>
+          <a:blip r:embed="rId7" cstate="print">
             <a:extLst>
               <a:ext uri="{28A0092B-C50C-407E-A947-70E740481C1C}">
                 <a14:useLocalDpi xmlns:a14="http://schemas.microsoft.com/office/drawing/2010/main" val="0"/>
@@ -4013,7 +5564,473 @@
     </p:spTree>
     <p:extLst>
       <p:ext uri="{BB962C8B-B14F-4D97-AF65-F5344CB8AC3E}">
-        <p14:creationId xmlns:p14="http://schemas.microsoft.com/office/powerpoint/2010/main" val="1436105132"/>
+        <p14:creationId xmlns:p14="http://schemas.microsoft.com/office/powerpoint/2010/main" val="1423002172"/>
+      </p:ext>
+    </p:extLst>
+  </p:cSld>
+  <p:clrMapOvr>
+    <a:masterClrMapping/>
+  </p:clrMapOvr>
+  <p:timing>
+    <p:tnLst>
+      <p:par>
+        <p:cTn id="1" dur="indefinite" restart="never" nodeType="tmRoot"/>
+      </p:par>
+    </p:tnLst>
+  </p:timing>
+</p:sld>
+</file>
+
+<file path=ppt/slides/slide12.xml><?xml version="1.0" encoding="utf-8"?>
+<p:sld xmlns:a="http://schemas.openxmlformats.org/drawingml/2006/main" xmlns:r="http://schemas.openxmlformats.org/officeDocument/2006/relationships" xmlns:p="http://schemas.openxmlformats.org/presentationml/2006/main">
+  <p:cSld>
+    <p:spTree>
+      <p:nvGrpSpPr>
+        <p:cNvPr id="1" name=""/>
+        <p:cNvGrpSpPr/>
+        <p:nvPr/>
+      </p:nvGrpSpPr>
+      <p:grpSpPr>
+        <a:xfrm>
+          <a:off x="0" y="0"/>
+          <a:ext cx="0" cy="0"/>
+          <a:chOff x="0" y="0"/>
+          <a:chExt cx="0" cy="0"/>
+        </a:xfrm>
+      </p:grpSpPr>
+      <p:pic>
+        <p:nvPicPr>
+          <p:cNvPr id="2" name="Picture 1"/>
+          <p:cNvPicPr>
+            <a:picLocks noChangeAspect="1"/>
+          </p:cNvPicPr>
+          <p:nvPr/>
+        </p:nvPicPr>
+        <p:blipFill>
+          <a:blip r:embed="rId3"/>
+          <a:stretch>
+            <a:fillRect/>
+          </a:stretch>
+        </p:blipFill>
+        <p:spPr>
+          <a:xfrm>
+            <a:off x="4691062" y="557212"/>
+            <a:ext cx="2809875" cy="5743575"/>
+          </a:xfrm>
+          <a:prstGeom prst="rect">
+            <a:avLst/>
+          </a:prstGeom>
+        </p:spPr>
+      </p:pic>
+      <p:graphicFrame>
+        <p:nvGraphicFramePr>
+          <p:cNvPr id="4" name="Table 3"/>
+          <p:cNvGraphicFramePr>
+            <a:graphicFrameLocks noGrp="1"/>
+          </p:cNvGraphicFramePr>
+          <p:nvPr>
+            <p:extLst>
+              <p:ext uri="{D42A27DB-BD31-4B8C-83A1-F6EECF244321}">
+                <p14:modId xmlns:p14="http://schemas.microsoft.com/office/powerpoint/2010/main" val="1182777481"/>
+              </p:ext>
+            </p:extLst>
+          </p:nvPr>
+        </p:nvGraphicFramePr>
+        <p:xfrm>
+          <a:off x="4956357" y="1409780"/>
+          <a:ext cx="2281205" cy="886746"/>
+        </p:xfrm>
+        <a:graphic>
+          <a:graphicData uri="http://schemas.openxmlformats.org/drawingml/2006/table">
+            <a:tbl>
+              <a:tblPr firstRow="1" bandRow="1">
+                <a:tableStyleId>{2D5ABB26-0587-4C30-8999-92F81FD0307C}</a:tableStyleId>
+              </a:tblPr>
+              <a:tblGrid>
+                <a:gridCol w="1772247"/>
+                <a:gridCol w="508958"/>
+              </a:tblGrid>
+              <a:tr h="443373">
+                <a:tc gridSpan="2">
+                  <a:txBody>
+                    <a:bodyPr/>
+                    <a:lstStyle/>
+                    <a:p>
+                      <a:pPr algn="ctr"/>
+                      <a:r>
+                        <a:rPr lang="en-US" dirty="0" smtClean="0"/>
+                        <a:t> </a:t>
+                      </a:r>
+                      <a:r>
+                        <a:rPr lang="en-US" dirty="0" smtClean="0"/>
+                        <a:t>Settings</a:t>
+                      </a:r>
+                      <a:endParaRPr lang="en-US" dirty="0"/>
+                    </a:p>
+                  </a:txBody>
+                  <a:tcPr>
+                    <a:lnB w="12700" cap="flat" cmpd="sng" algn="ctr">
+                      <a:solidFill>
+                        <a:schemeClr val="tx1"/>
+                      </a:solidFill>
+                      <a:prstDash val="solid"/>
+                      <a:round/>
+                      <a:headEnd type="none" w="med" len="med"/>
+                      <a:tailEnd type="none" w="med" len="med"/>
+                    </a:lnB>
+                  </a:tcPr>
+                </a:tc>
+                <a:tc hMerge="1">
+                  <a:txBody>
+                    <a:bodyPr/>
+                    <a:lstStyle/>
+                    <a:p>
+                      <a:endParaRPr lang="en-US"/>
+                    </a:p>
+                  </a:txBody>
+                  <a:tcPr/>
+                </a:tc>
+              </a:tr>
+              <a:tr h="443373">
+                <a:tc>
+                  <a:txBody>
+                    <a:bodyPr/>
+                    <a:lstStyle/>
+                    <a:p>
+                      <a:pPr algn="l"/>
+                      <a:r>
+                        <a:rPr lang="en-US" sz="1400" dirty="0" smtClean="0"/>
+                        <a:t>Logout</a:t>
+                      </a:r>
+                      <a:endParaRPr lang="en-US" sz="1400" dirty="0"/>
+                    </a:p>
+                  </a:txBody>
+                  <a:tcPr>
+                    <a:lnL w="12700" cap="flat" cmpd="sng" algn="ctr">
+                      <a:solidFill>
+                        <a:schemeClr val="tx1"/>
+                      </a:solidFill>
+                      <a:prstDash val="solid"/>
+                      <a:round/>
+                      <a:headEnd type="none" w="med" len="med"/>
+                      <a:tailEnd type="none" w="med" len="med"/>
+                    </a:lnL>
+                    <a:lnR w="12700" cap="flat" cmpd="sng" algn="ctr">
+                      <a:solidFill>
+                        <a:schemeClr val="tx1"/>
+                      </a:solidFill>
+                      <a:prstDash val="solid"/>
+                      <a:round/>
+                      <a:headEnd type="none" w="med" len="med"/>
+                      <a:tailEnd type="none" w="med" len="med"/>
+                    </a:lnR>
+                    <a:lnT w="12700" cap="flat" cmpd="sng" algn="ctr">
+                      <a:solidFill>
+                        <a:schemeClr val="tx1"/>
+                      </a:solidFill>
+                      <a:prstDash val="solid"/>
+                      <a:round/>
+                      <a:headEnd type="none" w="med" len="med"/>
+                      <a:tailEnd type="none" w="med" len="med"/>
+                    </a:lnT>
+                    <a:lnB w="12700" cap="flat" cmpd="sng" algn="ctr">
+                      <a:solidFill>
+                        <a:schemeClr val="tx1"/>
+                      </a:solidFill>
+                      <a:prstDash val="solid"/>
+                      <a:round/>
+                      <a:headEnd type="none" w="med" len="med"/>
+                      <a:tailEnd type="none" w="med" len="med"/>
+                    </a:lnB>
+                  </a:tcPr>
+                </a:tc>
+                <a:tc>
+                  <a:txBody>
+                    <a:bodyPr/>
+                    <a:lstStyle/>
+                    <a:p>
+                      <a:endParaRPr lang="en-US" sz="1800" kern="1200" dirty="0">
+                        <a:solidFill>
+                          <a:schemeClr val="tx1"/>
+                        </a:solidFill>
+                        <a:latin typeface="+mn-lt"/>
+                        <a:ea typeface="+mn-ea"/>
+                        <a:cs typeface="+mn-cs"/>
+                      </a:endParaRPr>
+                    </a:p>
+                  </a:txBody>
+                  <a:tcPr>
+                    <a:lnL w="12700" cap="flat" cmpd="sng" algn="ctr">
+                      <a:solidFill>
+                        <a:schemeClr val="tx1"/>
+                      </a:solidFill>
+                      <a:prstDash val="solid"/>
+                      <a:round/>
+                      <a:headEnd type="none" w="med" len="med"/>
+                      <a:tailEnd type="none" w="med" len="med"/>
+                    </a:lnL>
+                    <a:lnR w="12700" cap="flat" cmpd="sng" algn="ctr">
+                      <a:solidFill>
+                        <a:schemeClr val="tx1"/>
+                      </a:solidFill>
+                      <a:prstDash val="solid"/>
+                      <a:round/>
+                      <a:headEnd type="none" w="med" len="med"/>
+                      <a:tailEnd type="none" w="med" len="med"/>
+                    </a:lnR>
+                    <a:lnT w="12700" cap="flat" cmpd="sng" algn="ctr">
+                      <a:solidFill>
+                        <a:schemeClr val="tx1"/>
+                      </a:solidFill>
+                      <a:prstDash val="solid"/>
+                      <a:round/>
+                      <a:headEnd type="none" w="med" len="med"/>
+                      <a:tailEnd type="none" w="med" len="med"/>
+                    </a:lnT>
+                    <a:lnB w="12700" cap="flat" cmpd="sng" algn="ctr">
+                      <a:solidFill>
+                        <a:schemeClr val="tx1"/>
+                      </a:solidFill>
+                      <a:prstDash val="solid"/>
+                      <a:round/>
+                      <a:headEnd type="none" w="med" len="med"/>
+                      <a:tailEnd type="none" w="med" len="med"/>
+                    </a:lnB>
+                  </a:tcPr>
+                </a:tc>
+              </a:tr>
+            </a:tbl>
+          </a:graphicData>
+        </a:graphic>
+      </p:graphicFrame>
+      <p:sp>
+        <p:nvSpPr>
+          <p:cNvPr id="3" name="Left Arrow 2">
+            <a:hlinkClick r:id="rId4" action="ppaction://hlinksldjump"/>
+          </p:cNvPr>
+          <p:cNvSpPr/>
+          <p:nvPr/>
+        </p:nvSpPr>
+        <p:spPr>
+          <a:xfrm>
+            <a:off x="5986732" y="5098212"/>
+            <a:ext cx="189781" cy="112143"/>
+          </a:xfrm>
+          <a:prstGeom prst="leftArrow">
+            <a:avLst/>
+          </a:prstGeom>
+        </p:spPr>
+        <p:style>
+          <a:lnRef idx="2">
+            <a:schemeClr val="accent1">
+              <a:shade val="50000"/>
+            </a:schemeClr>
+          </a:lnRef>
+          <a:fillRef idx="1">
+            <a:schemeClr val="accent1"/>
+          </a:fillRef>
+          <a:effectRef idx="0">
+            <a:schemeClr val="accent1"/>
+          </a:effectRef>
+          <a:fontRef idx="minor">
+            <a:schemeClr val="lt1"/>
+          </a:fontRef>
+        </p:style>
+        <p:txBody>
+          <a:bodyPr rtlCol="0" anchor="ctr"/>
+          <a:lstStyle/>
+          <a:p>
+            <a:pPr algn="ctr"/>
+            <a:endParaRPr lang="en-US"/>
+          </a:p>
+        </p:txBody>
+      </p:sp>
+      <p:sp>
+        <p:nvSpPr>
+          <p:cNvPr id="8" name="Rectangle 7"/>
+          <p:cNvSpPr/>
+          <p:nvPr/>
+        </p:nvSpPr>
+        <p:spPr>
+          <a:xfrm>
+            <a:off x="4958863" y="4981766"/>
+            <a:ext cx="2250831" cy="433754"/>
+          </a:xfrm>
+          <a:prstGeom prst="rect">
+            <a:avLst/>
+          </a:prstGeom>
+          <a:solidFill>
+            <a:schemeClr val="bg1">
+              <a:lumMod val="95000"/>
+            </a:schemeClr>
+          </a:solidFill>
+          <a:ln>
+            <a:noFill/>
+          </a:ln>
+        </p:spPr>
+        <p:style>
+          <a:lnRef idx="2">
+            <a:schemeClr val="accent1">
+              <a:shade val="50000"/>
+            </a:schemeClr>
+          </a:lnRef>
+          <a:fillRef idx="1">
+            <a:schemeClr val="accent1"/>
+          </a:fillRef>
+          <a:effectRef idx="0">
+            <a:schemeClr val="accent1"/>
+          </a:effectRef>
+          <a:fontRef idx="minor">
+            <a:schemeClr val="lt1"/>
+          </a:fontRef>
+        </p:style>
+        <p:txBody>
+          <a:bodyPr rtlCol="0" anchor="ctr"/>
+          <a:lstStyle/>
+          <a:p>
+            <a:pPr algn="ctr"/>
+            <a:endParaRPr lang="en-US"/>
+          </a:p>
+        </p:txBody>
+      </p:sp>
+      <p:pic>
+        <p:nvPicPr>
+          <p:cNvPr id="6" name="Picture 5">
+            <a:hlinkClick r:id="rId5" action="ppaction://hlinksldjump"/>
+          </p:cNvPr>
+          <p:cNvPicPr>
+            <a:picLocks noChangeAspect="1"/>
+          </p:cNvPicPr>
+          <p:nvPr/>
+        </p:nvPicPr>
+        <p:blipFill>
+          <a:blip r:embed="rId6" cstate="print">
+            <a:extLst>
+              <a:ext uri="{28A0092B-C50C-407E-A947-70E740481C1C}">
+                <a14:useLocalDpi xmlns:a14="http://schemas.microsoft.com/office/drawing/2010/main" val="0"/>
+              </a:ext>
+            </a:extLst>
+          </a:blip>
+          <a:stretch>
+            <a:fillRect/>
+          </a:stretch>
+        </p:blipFill>
+        <p:spPr>
+          <a:xfrm>
+            <a:off x="6848371" y="1948086"/>
+            <a:ext cx="273437" cy="273437"/>
+          </a:xfrm>
+          <a:prstGeom prst="rect">
+            <a:avLst/>
+          </a:prstGeom>
+        </p:spPr>
+      </p:pic>
+      <p:pic>
+        <p:nvPicPr>
+          <p:cNvPr id="12" name="Picture 11"/>
+          <p:cNvPicPr>
+            <a:picLocks noChangeAspect="1"/>
+          </p:cNvPicPr>
+          <p:nvPr/>
+        </p:nvPicPr>
+        <p:blipFill>
+          <a:blip r:embed="rId7" cstate="print">
+            <a:extLst>
+              <a:ext uri="{28A0092B-C50C-407E-A947-70E740481C1C}">
+                <a14:useLocalDpi xmlns:a14="http://schemas.microsoft.com/office/drawing/2010/main" val="0"/>
+              </a:ext>
+            </a:extLst>
+          </a:blip>
+          <a:stretch>
+            <a:fillRect/>
+          </a:stretch>
+        </p:blipFill>
+        <p:spPr>
+          <a:xfrm>
+            <a:off x="5331525" y="5054003"/>
+            <a:ext cx="290089" cy="290089"/>
+          </a:xfrm>
+          <a:prstGeom prst="rect">
+            <a:avLst/>
+          </a:prstGeom>
+        </p:spPr>
+      </p:pic>
+      <p:pic>
+        <p:nvPicPr>
+          <p:cNvPr id="13" name="Picture 12"/>
+          <p:cNvPicPr>
+            <a:picLocks noChangeAspect="1"/>
+          </p:cNvPicPr>
+          <p:nvPr/>
+        </p:nvPicPr>
+        <p:blipFill>
+          <a:blip r:embed="rId8" cstate="print">
+            <a:extLst>
+              <a:ext uri="{28A0092B-C50C-407E-A947-70E740481C1C}">
+                <a14:useLocalDpi xmlns:a14="http://schemas.microsoft.com/office/drawing/2010/main" val="0"/>
+              </a:ext>
+            </a:extLst>
+          </a:blip>
+          <a:stretch>
+            <a:fillRect/>
+          </a:stretch>
+        </p:blipFill>
+        <p:spPr>
+          <a:xfrm>
+            <a:off x="6565077" y="5051299"/>
+            <a:ext cx="327962" cy="327962"/>
+          </a:xfrm>
+          <a:prstGeom prst="rect">
+            <a:avLst/>
+          </a:prstGeom>
+        </p:spPr>
+      </p:pic>
+      <p:sp>
+        <p:nvSpPr>
+          <p:cNvPr id="14" name="Left Arrow 13">
+            <a:hlinkClick r:id="rId4" action="ppaction://hlinksldjump"/>
+          </p:cNvPr>
+          <p:cNvSpPr/>
+          <p:nvPr/>
+        </p:nvSpPr>
+        <p:spPr>
+          <a:xfrm>
+            <a:off x="5109711" y="1557843"/>
+            <a:ext cx="189781" cy="112143"/>
+          </a:xfrm>
+          <a:prstGeom prst="leftArrow">
+            <a:avLst/>
+          </a:prstGeom>
+        </p:spPr>
+        <p:style>
+          <a:lnRef idx="2">
+            <a:schemeClr val="accent1">
+              <a:shade val="50000"/>
+            </a:schemeClr>
+          </a:lnRef>
+          <a:fillRef idx="1">
+            <a:schemeClr val="accent1"/>
+          </a:fillRef>
+          <a:effectRef idx="0">
+            <a:schemeClr val="accent1"/>
+          </a:effectRef>
+          <a:fontRef idx="minor">
+            <a:schemeClr val="lt1"/>
+          </a:fontRef>
+        </p:style>
+        <p:txBody>
+          <a:bodyPr rtlCol="0" anchor="ctr"/>
+          <a:lstStyle/>
+          <a:p>
+            <a:pPr algn="ctr"/>
+            <a:endParaRPr lang="en-US"/>
+          </a:p>
+        </p:txBody>
+      </p:sp>
+    </p:spTree>
+    <p:extLst>
+      <p:ext uri="{BB962C8B-B14F-4D97-AF65-F5344CB8AC3E}">
+        <p14:creationId xmlns:p14="http://schemas.microsoft.com/office/powerpoint/2010/main" val="738042136"/>
       </p:ext>
     </p:extLst>
   </p:cSld>
@@ -5568,14 +7585,16 @@
       </p:sp>
       <p:pic>
         <p:nvPicPr>
-          <p:cNvPr id="14" name="Picture 13"/>
+          <p:cNvPr id="14" name="Picture 13">
+            <a:hlinkClick r:id="rId7" action="ppaction://hlinksldjump"/>
+          </p:cNvPr>
           <p:cNvPicPr>
             <a:picLocks noChangeAspect="1"/>
           </p:cNvPicPr>
           <p:nvPr/>
         </p:nvPicPr>
         <p:blipFill>
-          <a:blip r:embed="rId7" cstate="print">
+          <a:blip r:embed="rId8" cstate="print">
             <a:extLst>
               <a:ext uri="{28A0092B-C50C-407E-A947-70E740481C1C}">
                 <a14:useLocalDpi xmlns:a14="http://schemas.microsoft.com/office/drawing/2010/main" val="0"/>
@@ -5605,7 +7624,7 @@
           <p:nvPr/>
         </p:nvPicPr>
         <p:blipFill>
-          <a:blip r:embed="rId8" cstate="print">
+          <a:blip r:embed="rId9" cstate="print">
             <a:extLst>
               <a:ext uri="{28A0092B-C50C-407E-A947-70E740481C1C}">
                 <a14:useLocalDpi xmlns:a14="http://schemas.microsoft.com/office/drawing/2010/main" val="0"/>
@@ -6991,14 +9010,16 @@
       </p:sp>
       <p:pic>
         <p:nvPicPr>
-          <p:cNvPr id="17" name="Picture 16"/>
+          <p:cNvPr id="17" name="Picture 16">
+            <a:hlinkClick r:id="rId5" action="ppaction://hlinksldjump"/>
+          </p:cNvPr>
           <p:cNvPicPr>
             <a:picLocks noChangeAspect="1"/>
           </p:cNvPicPr>
           <p:nvPr/>
         </p:nvPicPr>
         <p:blipFill>
-          <a:blip r:embed="rId5" cstate="print">
+          <a:blip r:embed="rId6" cstate="print">
             <a:extLst>
               <a:ext uri="{28A0092B-C50C-407E-A947-70E740481C1C}">
                 <a14:useLocalDpi xmlns:a14="http://schemas.microsoft.com/office/drawing/2010/main" val="0"/>
@@ -7028,7 +9049,7 @@
           <p:nvPr/>
         </p:nvPicPr>
         <p:blipFill>
-          <a:blip r:embed="rId6" cstate="print">
+          <a:blip r:embed="rId7" cstate="print">
             <a:extLst>
               <a:ext uri="{28A0092B-C50C-407E-A947-70E740481C1C}">
                 <a14:useLocalDpi xmlns:a14="http://schemas.microsoft.com/office/drawing/2010/main" val="0"/>
@@ -7577,14 +9598,16 @@
       </p:sp>
       <p:pic>
         <p:nvPicPr>
-          <p:cNvPr id="8" name="Picture 7"/>
+          <p:cNvPr id="8" name="Picture 7">
+            <a:hlinkClick r:id="rId9" action="ppaction://hlinksldjump"/>
+          </p:cNvPr>
           <p:cNvPicPr>
             <a:picLocks noChangeAspect="1"/>
           </p:cNvPicPr>
           <p:nvPr/>
         </p:nvPicPr>
         <p:blipFill>
-          <a:blip r:embed="rId9" cstate="print">
+          <a:blip r:embed="rId10" cstate="print">
             <a:extLst>
               <a:ext uri="{28A0092B-C50C-407E-A947-70E740481C1C}">
                 <a14:useLocalDpi xmlns:a14="http://schemas.microsoft.com/office/drawing/2010/main" val="0"/>
@@ -7614,7 +9637,7 @@
           <p:nvPr/>
         </p:nvPicPr>
         <p:blipFill>
-          <a:blip r:embed="rId10" cstate="print">
+          <a:blip r:embed="rId11" cstate="print">
             <a:extLst>
               <a:ext uri="{28A0092B-C50C-407E-A947-70E740481C1C}">
                 <a14:useLocalDpi xmlns:a14="http://schemas.microsoft.com/office/drawing/2010/main" val="0"/>
@@ -8161,14 +10184,16 @@
       </p:sp>
       <p:pic>
         <p:nvPicPr>
-          <p:cNvPr id="9" name="Picture 8"/>
+          <p:cNvPr id="9" name="Picture 8">
+            <a:hlinkClick r:id="rId8" action="ppaction://hlinksldjump"/>
+          </p:cNvPr>
           <p:cNvPicPr>
             <a:picLocks noChangeAspect="1"/>
           </p:cNvPicPr>
           <p:nvPr/>
         </p:nvPicPr>
         <p:blipFill>
-          <a:blip r:embed="rId8" cstate="print">
+          <a:blip r:embed="rId9" cstate="print">
             <a:extLst>
               <a:ext uri="{28A0092B-C50C-407E-A947-70E740481C1C}">
                 <a14:useLocalDpi xmlns:a14="http://schemas.microsoft.com/office/drawing/2010/main" val="0"/>
@@ -8198,7 +10223,7 @@
           <p:nvPr/>
         </p:nvPicPr>
         <p:blipFill>
-          <a:blip r:embed="rId9" cstate="print">
+          <a:blip r:embed="rId10" cstate="print">
             <a:extLst>
               <a:ext uri="{28A0092B-C50C-407E-A947-70E740481C1C}">
                 <a14:useLocalDpi xmlns:a14="http://schemas.microsoft.com/office/drawing/2010/main" val="0"/>
@@ -9662,14 +11687,16 @@
       </p:sp>
       <p:pic>
         <p:nvPicPr>
-          <p:cNvPr id="16" name="Picture 15"/>
+          <p:cNvPr id="16" name="Picture 15">
+            <a:hlinkClick r:id="rId8" action="ppaction://hlinksldjump"/>
+          </p:cNvPr>
           <p:cNvPicPr>
             <a:picLocks noChangeAspect="1"/>
           </p:cNvPicPr>
           <p:nvPr/>
         </p:nvPicPr>
         <p:blipFill>
-          <a:blip r:embed="rId8" cstate="print">
+          <a:blip r:embed="rId9" cstate="print">
             <a:extLst>
               <a:ext uri="{28A0092B-C50C-407E-A947-70E740481C1C}">
                 <a14:useLocalDpi xmlns:a14="http://schemas.microsoft.com/office/drawing/2010/main" val="0"/>
@@ -9699,7 +11726,7 @@
           <p:nvPr/>
         </p:nvPicPr>
         <p:blipFill>
-          <a:blip r:embed="rId9" cstate="print">
+          <a:blip r:embed="rId10" cstate="print">
             <a:extLst>
               <a:ext uri="{28A0092B-C50C-407E-A947-70E740481C1C}">
                 <a14:useLocalDpi xmlns:a14="http://schemas.microsoft.com/office/drawing/2010/main" val="0"/>
@@ -9723,7 +11750,7 @@
       <p:sp>
         <p:nvSpPr>
           <p:cNvPr id="18" name="Left Arrow 17">
-            <a:hlinkClick r:id="rId10" action="ppaction://hlinksldjump"/>
+            <a:hlinkClick r:id="rId11" action="ppaction://hlinksldjump"/>
           </p:cNvPr>
           <p:cNvSpPr/>
           <p:nvPr/>
@@ -11165,14 +13192,16 @@
       </p:sp>
       <p:pic>
         <p:nvPicPr>
-          <p:cNvPr id="14" name="Picture 13"/>
+          <p:cNvPr id="14" name="Picture 13">
+            <a:hlinkClick r:id="rId9" action="ppaction://hlinksldjump"/>
+          </p:cNvPr>
           <p:cNvPicPr>
             <a:picLocks noChangeAspect="1"/>
           </p:cNvPicPr>
           <p:nvPr/>
         </p:nvPicPr>
         <p:blipFill>
-          <a:blip r:embed="rId9" cstate="print">
+          <a:blip r:embed="rId10" cstate="print">
             <a:extLst>
               <a:ext uri="{28A0092B-C50C-407E-A947-70E740481C1C}">
                 <a14:useLocalDpi xmlns:a14="http://schemas.microsoft.com/office/drawing/2010/main" val="0"/>
@@ -11202,7 +13231,7 @@
           <p:nvPr/>
         </p:nvPicPr>
         <p:blipFill>
-          <a:blip r:embed="rId10" cstate="print">
+          <a:blip r:embed="rId11" cstate="print">
             <a:extLst>
               <a:ext uri="{28A0092B-C50C-407E-A947-70E740481C1C}">
                 <a14:useLocalDpi xmlns:a14="http://schemas.microsoft.com/office/drawing/2010/main" val="0"/>
@@ -11226,7 +13255,7 @@
       <p:sp>
         <p:nvSpPr>
           <p:cNvPr id="21" name="Left Arrow 20">
-            <a:hlinkClick r:id="rId11" action="ppaction://hlinksldjump"/>
+            <a:hlinkClick r:id="rId12" action="ppaction://hlinksldjump"/>
           </p:cNvPr>
           <p:cNvSpPr/>
           <p:nvPr/>
@@ -11268,7 +13297,7 @@
       <p:pic>
         <p:nvPicPr>
           <p:cNvPr id="22" name="Picture 21">
-            <a:hlinkClick r:id="rId12" action="ppaction://hlinksldjump"/>
+            <a:hlinkClick r:id="rId13" action="ppaction://hlinksldjump"/>
           </p:cNvPr>
           <p:cNvPicPr>
             <a:picLocks noChangeAspect="1"/>
@@ -11863,14 +13892,16 @@
       </p:sp>
       <p:pic>
         <p:nvPicPr>
-          <p:cNvPr id="9" name="Picture 8"/>
+          <p:cNvPr id="9" name="Picture 8">
+            <a:hlinkClick r:id="rId5" action="ppaction://hlinksldjump"/>
+          </p:cNvPr>
           <p:cNvPicPr>
             <a:picLocks noChangeAspect="1"/>
           </p:cNvPicPr>
           <p:nvPr/>
         </p:nvPicPr>
         <p:blipFill>
-          <a:blip r:embed="rId5" cstate="print">
+          <a:blip r:embed="rId6" cstate="print">
             <a:extLst>
               <a:ext uri="{28A0092B-C50C-407E-A947-70E740481C1C}">
                 <a14:useLocalDpi xmlns:a14="http://schemas.microsoft.com/office/drawing/2010/main" val="0"/>
@@ -11900,7 +13931,7 @@
           <p:nvPr/>
         </p:nvPicPr>
         <p:blipFill>
-          <a:blip r:embed="rId6" cstate="print">
+          <a:blip r:embed="rId7" cstate="print">
             <a:extLst>
               <a:ext uri="{28A0092B-C50C-407E-A947-70E740481C1C}">
                 <a14:useLocalDpi xmlns:a14="http://schemas.microsoft.com/office/drawing/2010/main" val="0"/>

</xml_diff>